<commit_message>
ADX -> Azure Data Explorer in an image
</commit_message>
<xml_diff>
--- a/data-explorer/kusto/api/images/host-web-ux-in-iframe/image-resources/embed-adx-auth-flow.pptx
+++ b/data-explorer/kusto/api/images/host-web-ux-in-iframe/image-resources/embed-adx-auth-flow.pptx
@@ -205,7 +205,7 @@
           <a:p>
             <a:fld id="{59C06A4E-21F7-49C2-A72E-40458CA8D8B3}" type="datetimeFigureOut">
               <a:rPr lang="en-US" smtClean="0"/>
-              <a:t>6/1/2023</a:t>
+              <a:t>6/5/2023</a:t>
             </a:fld>
             <a:endParaRPr lang="en-US"/>
           </a:p>
@@ -619,7 +619,7 @@
           <a:p>
             <a:fld id="{995E3684-18F6-4228-A26E-309F071A5DF4}" type="datetimeFigureOut">
               <a:rPr lang="en-US" smtClean="0"/>
-              <a:t>6/1/2023</a:t>
+              <a:t>6/5/2023</a:t>
             </a:fld>
             <a:endParaRPr lang="en-US"/>
           </a:p>
@@ -817,7 +817,7 @@
           <a:p>
             <a:fld id="{995E3684-18F6-4228-A26E-309F071A5DF4}" type="datetimeFigureOut">
               <a:rPr lang="en-US" smtClean="0"/>
-              <a:t>6/1/2023</a:t>
+              <a:t>6/5/2023</a:t>
             </a:fld>
             <a:endParaRPr lang="en-US"/>
           </a:p>
@@ -1025,7 +1025,7 @@
           <a:p>
             <a:fld id="{995E3684-18F6-4228-A26E-309F071A5DF4}" type="datetimeFigureOut">
               <a:rPr lang="en-US" smtClean="0"/>
-              <a:t>6/1/2023</a:t>
+              <a:t>6/5/2023</a:t>
             </a:fld>
             <a:endParaRPr lang="en-US"/>
           </a:p>
@@ -1223,7 +1223,7 @@
           <a:p>
             <a:fld id="{995E3684-18F6-4228-A26E-309F071A5DF4}" type="datetimeFigureOut">
               <a:rPr lang="en-US" smtClean="0"/>
-              <a:t>6/1/2023</a:t>
+              <a:t>6/5/2023</a:t>
             </a:fld>
             <a:endParaRPr lang="en-US"/>
           </a:p>
@@ -1498,7 +1498,7 @@
           <a:p>
             <a:fld id="{995E3684-18F6-4228-A26E-309F071A5DF4}" type="datetimeFigureOut">
               <a:rPr lang="en-US" smtClean="0"/>
-              <a:t>6/1/2023</a:t>
+              <a:t>6/5/2023</a:t>
             </a:fld>
             <a:endParaRPr lang="en-US"/>
           </a:p>
@@ -1763,7 +1763,7 @@
           <a:p>
             <a:fld id="{995E3684-18F6-4228-A26E-309F071A5DF4}" type="datetimeFigureOut">
               <a:rPr lang="en-US" smtClean="0"/>
-              <a:t>6/1/2023</a:t>
+              <a:t>6/5/2023</a:t>
             </a:fld>
             <a:endParaRPr lang="en-US"/>
           </a:p>
@@ -2175,7 +2175,7 @@
           <a:p>
             <a:fld id="{995E3684-18F6-4228-A26E-309F071A5DF4}" type="datetimeFigureOut">
               <a:rPr lang="en-US" smtClean="0"/>
-              <a:t>6/1/2023</a:t>
+              <a:t>6/5/2023</a:t>
             </a:fld>
             <a:endParaRPr lang="en-US"/>
           </a:p>
@@ -2316,7 +2316,7 @@
           <a:p>
             <a:fld id="{995E3684-18F6-4228-A26E-309F071A5DF4}" type="datetimeFigureOut">
               <a:rPr lang="en-US" smtClean="0"/>
-              <a:t>6/1/2023</a:t>
+              <a:t>6/5/2023</a:t>
             </a:fld>
             <a:endParaRPr lang="en-US"/>
           </a:p>
@@ -2429,7 +2429,7 @@
           <a:p>
             <a:fld id="{995E3684-18F6-4228-A26E-309F071A5DF4}" type="datetimeFigureOut">
               <a:rPr lang="en-US" smtClean="0"/>
-              <a:t>6/1/2023</a:t>
+              <a:t>6/5/2023</a:t>
             </a:fld>
             <a:endParaRPr lang="en-US"/>
           </a:p>
@@ -2740,7 +2740,7 @@
           <a:p>
             <a:fld id="{995E3684-18F6-4228-A26E-309F071A5DF4}" type="datetimeFigureOut">
               <a:rPr lang="en-US" smtClean="0"/>
-              <a:t>6/1/2023</a:t>
+              <a:t>6/5/2023</a:t>
             </a:fld>
             <a:endParaRPr lang="en-US"/>
           </a:p>
@@ -3028,7 +3028,7 @@
           <a:p>
             <a:fld id="{995E3684-18F6-4228-A26E-309F071A5DF4}" type="datetimeFigureOut">
               <a:rPr lang="en-US" smtClean="0"/>
-              <a:t>6/1/2023</a:t>
+              <a:t>6/5/2023</a:t>
             </a:fld>
             <a:endParaRPr lang="en-US"/>
           </a:p>
@@ -3269,7 +3269,7 @@
           <a:p>
             <a:fld id="{995E3684-18F6-4228-A26E-309F071A5DF4}" type="datetimeFigureOut">
               <a:rPr lang="en-US" smtClean="0"/>
-              <a:t>6/1/2023</a:t>
+              <a:t>6/5/2023</a:t>
             </a:fld>
             <a:endParaRPr lang="en-US"/>
           </a:p>
@@ -3866,7 +3866,7 @@
             <a:pPr algn="ctr"/>
             <a:r>
               <a:rPr lang="en-US" sz="1200" dirty="0"/>
-              <a:t>ADX</a:t>
+              <a:t>Azure Data Explorer</a:t>
             </a:r>
           </a:p>
           <a:p>
@@ -5702,25 +5702,6 @@
 </file>
 
 <file path=customXml/item1.xml><?xml version="1.0" encoding="utf-8"?>
-<p:properties xmlns:p="http://schemas.microsoft.com/office/2006/metadata/properties" xmlns:xsi="http://www.w3.org/2001/XMLSchema-instance" xmlns:pc="http://schemas.microsoft.com/office/infopath/2007/PartnerControls">
-  <documentManagement>
-    <_ip_UnifiedCompliancePolicyUIAction xmlns="http://schemas.microsoft.com/sharepoint/v3" xsi:nil="true"/>
-    <_ip_UnifiedCompliancePolicyProperties xmlns="http://schemas.microsoft.com/sharepoint/v3" xsi:nil="true"/>
-    <_activity xmlns="9f8d8801-133a-4515-abe7-549b14edf80f" xsi:nil="true"/>
-  </documentManagement>
-</p:properties>
-</file>
-
-<file path=customXml/item2.xml><?xml version="1.0" encoding="utf-8"?>
-<?mso-contentType ?>
-<FormTemplates xmlns="http://schemas.microsoft.com/sharepoint/v3/contenttype/forms">
-  <Display>DocumentLibraryForm</Display>
-  <Edit>DocumentLibraryForm</Edit>
-  <New>DocumentLibraryForm</New>
-</FormTemplates>
-</file>
-
-<file path=customXml/item3.xml><?xml version="1.0" encoding="utf-8"?>
 <ct:contentTypeSchema xmlns:ct="http://schemas.microsoft.com/office/2006/metadata/contentType" xmlns:ma="http://schemas.microsoft.com/office/2006/metadata/properties/metaAttributes" ct:_="" ma:_="" ma:contentTypeName="Document" ma:contentTypeID="0x01010076BC22828B1DCB45898ED2B292553126" ma:contentTypeVersion="17" ma:contentTypeDescription="Create a new document." ma:contentTypeScope="" ma:versionID="15cfa47c2e02b775a72ba3522b7b3555">
   <xsd:schema xmlns:xsd="http://www.w3.org/2001/XMLSchema" xmlns:xs="http://www.w3.org/2001/XMLSchema" xmlns:p="http://schemas.microsoft.com/office/2006/metadata/properties" xmlns:ns1="http://schemas.microsoft.com/sharepoint/v3" xmlns:ns3="9f8d8801-133a-4515-abe7-549b14edf80f" xmlns:ns4="f6d0a6a2-1d82-43a3-8637-f9fbe595dce6" targetNamespace="http://schemas.microsoft.com/office/2006/metadata/properties" ma:root="true" ma:fieldsID="7b5010d147a4b724ebe62ef2d03cbcd9" ns1:_="" ns3:_="" ns4:_="">
     <xsd:import namespace="http://schemas.microsoft.com/sharepoint/v3"/>
@@ -5972,33 +5953,26 @@
 </ct:contentTypeSchema>
 </file>
 
-<file path=customXml/itemProps1.xml><?xml version="1.0" encoding="utf-8"?>
-<ds:datastoreItem xmlns:ds="http://schemas.openxmlformats.org/officeDocument/2006/customXml" ds:itemID="{957578D1-4BA5-464B-A196-4B1701621EBA}">
-  <ds:schemaRefs>
-    <ds:schemaRef ds:uri="http://schemas.openxmlformats.org/package/2006/metadata/core-properties"/>
-    <ds:schemaRef ds:uri="http://schemas.microsoft.com/office/2006/metadata/properties"/>
-    <ds:schemaRef ds:uri="http://schemas.microsoft.com/sharepoint/v3"/>
-    <ds:schemaRef ds:uri="http://purl.org/dc/terms/"/>
-    <ds:schemaRef ds:uri="http://schemas.microsoft.com/office/2006/documentManagement/types"/>
-    <ds:schemaRef ds:uri="http://schemas.microsoft.com/office/infopath/2007/PartnerControls"/>
-    <ds:schemaRef ds:uri="9f8d8801-133a-4515-abe7-549b14edf80f"/>
-    <ds:schemaRef ds:uri="f6d0a6a2-1d82-43a3-8637-f9fbe595dce6"/>
-    <ds:schemaRef ds:uri="http://www.w3.org/XML/1998/namespace"/>
-    <ds:schemaRef ds:uri="http://purl.org/dc/dcmitype/"/>
-    <ds:schemaRef ds:uri="http://purl.org/dc/elements/1.1/"/>
-  </ds:schemaRefs>
-</ds:datastoreItem>
+<file path=customXml/item2.xml><?xml version="1.0" encoding="utf-8"?>
+<?mso-contentType ?>
+<FormTemplates xmlns="http://schemas.microsoft.com/sharepoint/v3/contenttype/forms">
+  <Display>DocumentLibraryForm</Display>
+  <Edit>DocumentLibraryForm</Edit>
+  <New>DocumentLibraryForm</New>
+</FormTemplates>
 </file>
 
-<file path=customXml/itemProps2.xml><?xml version="1.0" encoding="utf-8"?>
-<ds:datastoreItem xmlns:ds="http://schemas.openxmlformats.org/officeDocument/2006/customXml" ds:itemID="{6F2F710B-ECF7-4E85-A3E8-DE606BFAB977}">
-  <ds:schemaRefs>
-    <ds:schemaRef ds:uri="http://schemas.microsoft.com/sharepoint/v3/contenttype/forms"/>
-  </ds:schemaRefs>
-</ds:datastoreItem>
+<file path=customXml/item3.xml><?xml version="1.0" encoding="utf-8"?>
+<p:properties xmlns:p="http://schemas.microsoft.com/office/2006/metadata/properties" xmlns:xsi="http://www.w3.org/2001/XMLSchema-instance" xmlns:pc="http://schemas.microsoft.com/office/infopath/2007/PartnerControls">
+  <documentManagement>
+    <_ip_UnifiedCompliancePolicyUIAction xmlns="http://schemas.microsoft.com/sharepoint/v3" xsi:nil="true"/>
+    <_ip_UnifiedCompliancePolicyProperties xmlns="http://schemas.microsoft.com/sharepoint/v3" xsi:nil="true"/>
+    <_activity xmlns="9f8d8801-133a-4515-abe7-549b14edf80f" xsi:nil="true"/>
+  </documentManagement>
+</p:properties>
 </file>
 
-<file path=customXml/itemProps3.xml><?xml version="1.0" encoding="utf-8"?>
+<file path=customXml/itemProps1.xml><?xml version="1.0" encoding="utf-8"?>
 <ds:datastoreItem xmlns:ds="http://schemas.openxmlformats.org/officeDocument/2006/customXml" ds:itemID="{8D861264-3F99-4CE9-AF3D-26B302D766CA}">
   <ds:schemaRefs>
     <ds:schemaRef ds:uri="http://schemas.microsoft.com/office/2006/metadata/contentType"/>
@@ -6018,6 +5992,32 @@
 </ds:datastoreItem>
 </file>
 
+<file path=customXml/itemProps2.xml><?xml version="1.0" encoding="utf-8"?>
+<ds:datastoreItem xmlns:ds="http://schemas.openxmlformats.org/officeDocument/2006/customXml" ds:itemID="{6F2F710B-ECF7-4E85-A3E8-DE606BFAB977}">
+  <ds:schemaRefs>
+    <ds:schemaRef ds:uri="http://schemas.microsoft.com/sharepoint/v3/contenttype/forms"/>
+  </ds:schemaRefs>
+</ds:datastoreItem>
+</file>
+
+<file path=customXml/itemProps3.xml><?xml version="1.0" encoding="utf-8"?>
+<ds:datastoreItem xmlns:ds="http://schemas.openxmlformats.org/officeDocument/2006/customXml" ds:itemID="{957578D1-4BA5-464B-A196-4B1701621EBA}">
+  <ds:schemaRefs>
+    <ds:schemaRef ds:uri="http://schemas.openxmlformats.org/package/2006/metadata/core-properties"/>
+    <ds:schemaRef ds:uri="http://schemas.microsoft.com/office/2006/metadata/properties"/>
+    <ds:schemaRef ds:uri="http://schemas.microsoft.com/sharepoint/v3"/>
+    <ds:schemaRef ds:uri="http://purl.org/dc/terms/"/>
+    <ds:schemaRef ds:uri="http://schemas.microsoft.com/office/2006/documentManagement/types"/>
+    <ds:schemaRef ds:uri="http://schemas.microsoft.com/office/infopath/2007/PartnerControls"/>
+    <ds:schemaRef ds:uri="9f8d8801-133a-4515-abe7-549b14edf80f"/>
+    <ds:schemaRef ds:uri="f6d0a6a2-1d82-43a3-8637-f9fbe595dce6"/>
+    <ds:schemaRef ds:uri="http://www.w3.org/XML/1998/namespace"/>
+    <ds:schemaRef ds:uri="http://purl.org/dc/dcmitype/"/>
+    <ds:schemaRef ds:uri="http://purl.org/dc/elements/1.1/"/>
+  </ds:schemaRefs>
+</ds:datastoreItem>
+</file>
+
 <file path=docMetadata/LabelInfo.xml><?xml version="1.0" encoding="utf-8"?>
 <clbl:labelList xmlns:clbl="http://schemas.microsoft.com/office/2020/mipLabelMetadata">
   <clbl:label id="{f42aa342-8706-4288-bd11-ebb85995028c}" enabled="1" method="Standard" siteId="{72f988bf-86f1-41af-91ab-2d7cd011db47}" removed="0"/>

</xml_diff>